<commit_message>
Added new image, and updated pptx template
</commit_message>
<xml_diff>
--- a/Templates/R-templates/Template2_ppt-presentation.pptx
+++ b/Templates/R-templates/Template2_ppt-presentation.pptx
@@ -3532,7 +3532,7 @@
             </a:pPr>
             <a:r>
               <a:rPr/>
-              <a:t>18-09-2024</a:t>
+              <a:t>19-09-2024</a:t>
             </a:r>
           </a:p>
         </p:txBody>
@@ -3736,7 +3736,7 @@
             <a:pPr lvl="1"/>
             <a:r>
               <a:rPr/>
-              <a:t>For unnumbered bullets, use a symbols such as the asterisk (“*“) to start your bullets.</a:t>
+              <a:t>For unnumbered bullets, use a symbols such as the asterisk (“*”) to start your bullets.</a:t>
             </a:r>
           </a:p>
           <a:p>
@@ -4398,6 +4398,20 @@
 <file path=ppt/slides/slide6.xml><?xml version="1.0" encoding="utf-8"?>
 <p:sld xmlns:a="http://schemas.openxmlformats.org/drawingml/2006/main" xmlns:r="http://schemas.openxmlformats.org/officeDocument/2006/relationships" xmlns:p="http://schemas.openxmlformats.org/presentationml/2006/main">
   <p:cSld>
+    <p:bg>
+      <p:bgPr>
+        <a:blipFill dpi="0" rotWithShape="1">
+          <a:blip r:embed="rId2">
+            <a:lum/>
+          </a:blip>
+          <a:srcRect/>
+          <a:stretch>
+            <a:fillRect t="-54000" b="-54000"/>
+          </a:stretch>
+        </a:blipFill>
+        <a:effectsLst/>
+      </p:bgPr>
+    </p:bg>
     <p:spTree>
       <p:nvGrpSpPr>
         <p:cNvPr id="1" name=""/>
@@ -4414,6 +4428,31 @@
       </p:grpSpPr>
       <p:sp>
         <p:nvSpPr>
+          <p:cNvPr id="2" name="Title 1"/>
+          <p:cNvSpPr>
+            <a:spLocks noGrp="1"/>
+          </p:cNvSpPr>
+          <p:nvPr>
+            <p:ph type="title"/>
+          </p:nvPr>
+        </p:nvSpPr>
+        <p:spPr/>
+        <p:txBody>
+          <a:bodyPr/>
+          <a:lstStyle/>
+          <a:p>
+            <a:pPr lvl="0" indent="0" marL="0">
+              <a:buNone/>
+            </a:pPr>
+            <a:r>
+              <a:rPr/>
+              <a:t>Background images</a:t>
+            </a:r>
+          </a:p>
+        </p:txBody>
+      </p:sp>
+      <p:sp>
+        <p:nvSpPr>
           <p:cNvPr id="3" name="Content Placeholder 2"/>
           <p:cNvSpPr>
             <a:spLocks noGrp="1"/>
@@ -4426,6 +4465,15 @@
         <p:txBody>
           <a:bodyPr/>
           <a:lstStyle/>
+          <a:p>
+            <a:pPr lvl="0" indent="0" marL="0">
+              <a:buNone/>
+            </a:pPr>
+            <a:r>
+              <a:rPr/>
+              <a:t>We can add a background image to slides, here for example the ZHAW logo.</a:t>
+            </a:r>
+          </a:p>
           <a:p>
             <a:pPr lvl="0" indent="0" marL="0">
               <a:buNone/>
@@ -4436,7 +4484,7 @@
             </a:r>
             <a:r>
               <a:rPr i="1">
-                <a:hlinkClick r:id="rId2"/>
+                <a:hlinkClick r:id="rId3"/>
               </a:rPr>
               <a:t>Ggplot2: Elegant Graphics for Data Analysis</a:t>
             </a:r>

</xml_diff>